<commit_message>
added rest of lession
</commit_message>
<xml_diff>
--- a/javascript-map-array-lesson.pptx
+++ b/javascript-map-array-lesson.pptx
@@ -4,9 +4,22 @@
   <p:sldMasterIdLst>
     <p:sldMasterId id="2147483648" r:id="rId1"/>
   </p:sldMasterIdLst>
+  <p:notesMasterIdLst>
+    <p:notesMasterId r:id="rId14"/>
+  </p:notesMasterIdLst>
   <p:sldIdLst>
     <p:sldId id="256" r:id="rId2"/>
-    <p:sldId id="257" r:id="rId3"/>
+    <p:sldId id="258" r:id="rId3"/>
+    <p:sldId id="257" r:id="rId4"/>
+    <p:sldId id="265" r:id="rId5"/>
+    <p:sldId id="264" r:id="rId6"/>
+    <p:sldId id="269" r:id="rId7"/>
+    <p:sldId id="270" r:id="rId8"/>
+    <p:sldId id="259" r:id="rId9"/>
+    <p:sldId id="260" r:id="rId10"/>
+    <p:sldId id="263" r:id="rId11"/>
+    <p:sldId id="267" r:id="rId12"/>
+    <p:sldId id="271" r:id="rId13"/>
   </p:sldIdLst>
   <p:sldSz cx="12192000" cy="6858000"/>
   <p:notesSz cx="6858000" cy="9144000"/>
@@ -105,7 +118,362 @@
       </a:defRPr>
     </a:lvl9pPr>
   </p:defaultTextStyle>
+  <p:extLst>
+    <p:ext uri="{EFAFB233-063F-42B5-8137-9DF3F51BA10A}">
+      <p15:sldGuideLst xmlns:p15="http://schemas.microsoft.com/office/powerpoint/2012/main"/>
+    </p:ext>
+  </p:extLst>
 </p:presentation>
+</file>
+
+<file path=ppt/notesMasters/notesMaster1.xml><?xml version="1.0" encoding="utf-8"?>
+<p:notesMaster xmlns:a="http://schemas.openxmlformats.org/drawingml/2006/main" xmlns:r="http://schemas.openxmlformats.org/officeDocument/2006/relationships" xmlns:p="http://schemas.openxmlformats.org/presentationml/2006/main">
+  <p:cSld>
+    <p:bg>
+      <p:bgRef idx="1001">
+        <a:schemeClr val="bg1"/>
+      </p:bgRef>
+    </p:bg>
+    <p:spTree>
+      <p:nvGrpSpPr>
+        <p:cNvPr id="1" name=""/>
+        <p:cNvGrpSpPr/>
+        <p:nvPr/>
+      </p:nvGrpSpPr>
+      <p:grpSpPr>
+        <a:xfrm>
+          <a:off x="0" y="0"/>
+          <a:ext cx="0" cy="0"/>
+          <a:chOff x="0" y="0"/>
+          <a:chExt cx="0" cy="0"/>
+        </a:xfrm>
+      </p:grpSpPr>
+      <p:sp>
+        <p:nvSpPr>
+          <p:cNvPr id="2" name="Header Placeholder 1"/>
+          <p:cNvSpPr>
+            <a:spLocks noGrp="1"/>
+          </p:cNvSpPr>
+          <p:nvPr>
+            <p:ph type="hdr" sz="quarter"/>
+          </p:nvPr>
+        </p:nvSpPr>
+        <p:spPr>
+          <a:xfrm>
+            <a:off x="0" y="0"/>
+            <a:ext cx="2971800" cy="458788"/>
+          </a:xfrm>
+          <a:prstGeom prst="rect">
+            <a:avLst/>
+          </a:prstGeom>
+        </p:spPr>
+        <p:txBody>
+          <a:bodyPr vert="horz" lIns="91440" tIns="45720" rIns="91440" bIns="45720" rtlCol="0"/>
+          <a:lstStyle>
+            <a:lvl1pPr algn="l">
+              <a:defRPr sz="1200"/>
+            </a:lvl1pPr>
+          </a:lstStyle>
+          <a:p>
+            <a:endParaRPr lang="en-US"/>
+          </a:p>
+        </p:txBody>
+      </p:sp>
+      <p:sp>
+        <p:nvSpPr>
+          <p:cNvPr id="3" name="Date Placeholder 2"/>
+          <p:cNvSpPr>
+            <a:spLocks noGrp="1"/>
+          </p:cNvSpPr>
+          <p:nvPr>
+            <p:ph type="dt" idx="1"/>
+          </p:nvPr>
+        </p:nvSpPr>
+        <p:spPr>
+          <a:xfrm>
+            <a:off x="3884613" y="0"/>
+            <a:ext cx="2971800" cy="458788"/>
+          </a:xfrm>
+          <a:prstGeom prst="rect">
+            <a:avLst/>
+          </a:prstGeom>
+        </p:spPr>
+        <p:txBody>
+          <a:bodyPr vert="horz" lIns="91440" tIns="45720" rIns="91440" bIns="45720" rtlCol="0"/>
+          <a:lstStyle>
+            <a:lvl1pPr algn="r">
+              <a:defRPr sz="1200"/>
+            </a:lvl1pPr>
+          </a:lstStyle>
+          <a:p>
+            <a:fld id="{0CE50735-9595-2C47-BE54-963C7F2EA794}" type="datetimeFigureOut">
+              <a:rPr lang="en-US" smtClean="0"/>
+              <a:t>5/2/17</a:t>
+            </a:fld>
+            <a:endParaRPr lang="en-US"/>
+          </a:p>
+        </p:txBody>
+      </p:sp>
+      <p:sp>
+        <p:nvSpPr>
+          <p:cNvPr id="4" name="Slide Image Placeholder 3"/>
+          <p:cNvSpPr>
+            <a:spLocks noGrp="1" noRot="1" noChangeAspect="1"/>
+          </p:cNvSpPr>
+          <p:nvPr>
+            <p:ph type="sldImg" idx="2"/>
+          </p:nvPr>
+        </p:nvSpPr>
+        <p:spPr>
+          <a:xfrm>
+            <a:off x="685800" y="1143000"/>
+            <a:ext cx="5486400" cy="3086100"/>
+          </a:xfrm>
+          <a:prstGeom prst="rect">
+            <a:avLst/>
+          </a:prstGeom>
+          <a:noFill/>
+          <a:ln w="12700">
+            <a:solidFill>
+              <a:prstClr val="black"/>
+            </a:solidFill>
+          </a:ln>
+        </p:spPr>
+        <p:txBody>
+          <a:bodyPr vert="horz" lIns="91440" tIns="45720" rIns="91440" bIns="45720" rtlCol="0" anchor="ctr"/>
+          <a:lstStyle/>
+          <a:p>
+            <a:endParaRPr lang="en-US"/>
+          </a:p>
+        </p:txBody>
+      </p:sp>
+      <p:sp>
+        <p:nvSpPr>
+          <p:cNvPr id="5" name="Notes Placeholder 4"/>
+          <p:cNvSpPr>
+            <a:spLocks noGrp="1"/>
+          </p:cNvSpPr>
+          <p:nvPr>
+            <p:ph type="body" sz="quarter" idx="3"/>
+          </p:nvPr>
+        </p:nvSpPr>
+        <p:spPr>
+          <a:xfrm>
+            <a:off x="685800" y="4400550"/>
+            <a:ext cx="5486400" cy="3600450"/>
+          </a:xfrm>
+          <a:prstGeom prst="rect">
+            <a:avLst/>
+          </a:prstGeom>
+        </p:spPr>
+        <p:txBody>
+          <a:bodyPr vert="horz" lIns="91440" tIns="45720" rIns="91440" bIns="45720" rtlCol="0"/>
+          <a:lstStyle/>
+          <a:p>
+            <a:pPr lvl="0"/>
+            <a:r>
+              <a:rPr lang="en-US" smtClean="0"/>
+              <a:t>Click to edit Master text styles</a:t>
+            </a:r>
+          </a:p>
+          <a:p>
+            <a:pPr lvl="1"/>
+            <a:r>
+              <a:rPr lang="en-US" smtClean="0"/>
+              <a:t>Second level</a:t>
+            </a:r>
+          </a:p>
+          <a:p>
+            <a:pPr lvl="2"/>
+            <a:r>
+              <a:rPr lang="en-US" smtClean="0"/>
+              <a:t>Third level</a:t>
+            </a:r>
+          </a:p>
+          <a:p>
+            <a:pPr lvl="3"/>
+            <a:r>
+              <a:rPr lang="en-US" smtClean="0"/>
+              <a:t>Fourth level</a:t>
+            </a:r>
+          </a:p>
+          <a:p>
+            <a:pPr lvl="4"/>
+            <a:r>
+              <a:rPr lang="en-US" smtClean="0"/>
+              <a:t>Fifth level</a:t>
+            </a:r>
+            <a:endParaRPr lang="en-US"/>
+          </a:p>
+        </p:txBody>
+      </p:sp>
+      <p:sp>
+        <p:nvSpPr>
+          <p:cNvPr id="6" name="Footer Placeholder 5"/>
+          <p:cNvSpPr>
+            <a:spLocks noGrp="1"/>
+          </p:cNvSpPr>
+          <p:nvPr>
+            <p:ph type="ftr" sz="quarter" idx="4"/>
+          </p:nvPr>
+        </p:nvSpPr>
+        <p:spPr>
+          <a:xfrm>
+            <a:off x="0" y="8685213"/>
+            <a:ext cx="2971800" cy="458787"/>
+          </a:xfrm>
+          <a:prstGeom prst="rect">
+            <a:avLst/>
+          </a:prstGeom>
+        </p:spPr>
+        <p:txBody>
+          <a:bodyPr vert="horz" lIns="91440" tIns="45720" rIns="91440" bIns="45720" rtlCol="0" anchor="b"/>
+          <a:lstStyle>
+            <a:lvl1pPr algn="l">
+              <a:defRPr sz="1200"/>
+            </a:lvl1pPr>
+          </a:lstStyle>
+          <a:p>
+            <a:endParaRPr lang="en-US"/>
+          </a:p>
+        </p:txBody>
+      </p:sp>
+      <p:sp>
+        <p:nvSpPr>
+          <p:cNvPr id="7" name="Slide Number Placeholder 6"/>
+          <p:cNvSpPr>
+            <a:spLocks noGrp="1"/>
+          </p:cNvSpPr>
+          <p:nvPr>
+            <p:ph type="sldNum" sz="quarter" idx="5"/>
+          </p:nvPr>
+        </p:nvSpPr>
+        <p:spPr>
+          <a:xfrm>
+            <a:off x="3884613" y="8685213"/>
+            <a:ext cx="2971800" cy="458787"/>
+          </a:xfrm>
+          <a:prstGeom prst="rect">
+            <a:avLst/>
+          </a:prstGeom>
+        </p:spPr>
+        <p:txBody>
+          <a:bodyPr vert="horz" lIns="91440" tIns="45720" rIns="91440" bIns="45720" rtlCol="0" anchor="b"/>
+          <a:lstStyle>
+            <a:lvl1pPr algn="r">
+              <a:defRPr sz="1200"/>
+            </a:lvl1pPr>
+          </a:lstStyle>
+          <a:p>
+            <a:fld id="{9BC4BDD8-3434-6E4D-9651-53BE4C7D5D70}" type="slidenum">
+              <a:rPr lang="en-US" smtClean="0"/>
+              <a:t>‹#›</a:t>
+            </a:fld>
+            <a:endParaRPr lang="en-US"/>
+          </a:p>
+        </p:txBody>
+      </p:sp>
+    </p:spTree>
+    <p:extLst>
+      <p:ext uri="{BB962C8B-B14F-4D97-AF65-F5344CB8AC3E}">
+        <p14:creationId xmlns:p14="http://schemas.microsoft.com/office/powerpoint/2010/main" val="1112835882"/>
+      </p:ext>
+    </p:extLst>
+  </p:cSld>
+  <p:clrMap bg1="lt1" tx1="dk1" bg2="lt2" tx2="dk2" accent1="accent1" accent2="accent2" accent3="accent3" accent4="accent4" accent5="accent5" accent6="accent6" hlink="hlink" folHlink="folHlink"/>
+  <p:notesStyle>
+    <a:lvl1pPr marL="0" algn="l" defTabSz="914400" rtl="0" eaLnBrk="1" latinLnBrk="0" hangingPunct="1">
+      <a:defRPr sz="1200" kern="1200">
+        <a:solidFill>
+          <a:schemeClr val="tx1"/>
+        </a:solidFill>
+        <a:latin typeface="+mn-lt"/>
+        <a:ea typeface="+mn-ea"/>
+        <a:cs typeface="+mn-cs"/>
+      </a:defRPr>
+    </a:lvl1pPr>
+    <a:lvl2pPr marL="457200" algn="l" defTabSz="914400" rtl="0" eaLnBrk="1" latinLnBrk="0" hangingPunct="1">
+      <a:defRPr sz="1200" kern="1200">
+        <a:solidFill>
+          <a:schemeClr val="tx1"/>
+        </a:solidFill>
+        <a:latin typeface="+mn-lt"/>
+        <a:ea typeface="+mn-ea"/>
+        <a:cs typeface="+mn-cs"/>
+      </a:defRPr>
+    </a:lvl2pPr>
+    <a:lvl3pPr marL="914400" algn="l" defTabSz="914400" rtl="0" eaLnBrk="1" latinLnBrk="0" hangingPunct="1">
+      <a:defRPr sz="1200" kern="1200">
+        <a:solidFill>
+          <a:schemeClr val="tx1"/>
+        </a:solidFill>
+        <a:latin typeface="+mn-lt"/>
+        <a:ea typeface="+mn-ea"/>
+        <a:cs typeface="+mn-cs"/>
+      </a:defRPr>
+    </a:lvl3pPr>
+    <a:lvl4pPr marL="1371600" algn="l" defTabSz="914400" rtl="0" eaLnBrk="1" latinLnBrk="0" hangingPunct="1">
+      <a:defRPr sz="1200" kern="1200">
+        <a:solidFill>
+          <a:schemeClr val="tx1"/>
+        </a:solidFill>
+        <a:latin typeface="+mn-lt"/>
+        <a:ea typeface="+mn-ea"/>
+        <a:cs typeface="+mn-cs"/>
+      </a:defRPr>
+    </a:lvl4pPr>
+    <a:lvl5pPr marL="1828800" algn="l" defTabSz="914400" rtl="0" eaLnBrk="1" latinLnBrk="0" hangingPunct="1">
+      <a:defRPr sz="1200" kern="1200">
+        <a:solidFill>
+          <a:schemeClr val="tx1"/>
+        </a:solidFill>
+        <a:latin typeface="+mn-lt"/>
+        <a:ea typeface="+mn-ea"/>
+        <a:cs typeface="+mn-cs"/>
+      </a:defRPr>
+    </a:lvl5pPr>
+    <a:lvl6pPr marL="2286000" algn="l" defTabSz="914400" rtl="0" eaLnBrk="1" latinLnBrk="0" hangingPunct="1">
+      <a:defRPr sz="1200" kern="1200">
+        <a:solidFill>
+          <a:schemeClr val="tx1"/>
+        </a:solidFill>
+        <a:latin typeface="+mn-lt"/>
+        <a:ea typeface="+mn-ea"/>
+        <a:cs typeface="+mn-cs"/>
+      </a:defRPr>
+    </a:lvl6pPr>
+    <a:lvl7pPr marL="2743200" algn="l" defTabSz="914400" rtl="0" eaLnBrk="1" latinLnBrk="0" hangingPunct="1">
+      <a:defRPr sz="1200" kern="1200">
+        <a:solidFill>
+          <a:schemeClr val="tx1"/>
+        </a:solidFill>
+        <a:latin typeface="+mn-lt"/>
+        <a:ea typeface="+mn-ea"/>
+        <a:cs typeface="+mn-cs"/>
+      </a:defRPr>
+    </a:lvl7pPr>
+    <a:lvl8pPr marL="3200400" algn="l" defTabSz="914400" rtl="0" eaLnBrk="1" latinLnBrk="0" hangingPunct="1">
+      <a:defRPr sz="1200" kern="1200">
+        <a:solidFill>
+          <a:schemeClr val="tx1"/>
+        </a:solidFill>
+        <a:latin typeface="+mn-lt"/>
+        <a:ea typeface="+mn-ea"/>
+        <a:cs typeface="+mn-cs"/>
+      </a:defRPr>
+    </a:lvl8pPr>
+    <a:lvl9pPr marL="3657600" algn="l" defTabSz="914400" rtl="0" eaLnBrk="1" latinLnBrk="0" hangingPunct="1">
+      <a:defRPr sz="1200" kern="1200">
+        <a:solidFill>
+          <a:schemeClr val="tx1"/>
+        </a:solidFill>
+        <a:latin typeface="+mn-lt"/>
+        <a:ea typeface="+mn-ea"/>
+        <a:cs typeface="+mn-cs"/>
+      </a:defRPr>
+    </a:lvl9pPr>
+  </p:notesStyle>
+</p:notesMaster>
 </file>
 
 <file path=ppt/slideLayouts/slideLayout1.xml><?xml version="1.0" encoding="utf-8"?>
@@ -203,7 +571,7 @@
           <a:effectLst/>
           <a:extLst>
             <a:ext uri="{91240B29-F687-4f45-9708-019B960494DF}">
-              <a14:hiddenLine xmlns:a14="http://schemas.microsoft.com/office/drawing/2010/main" xmlns="" w="9525">
+              <a14:hiddenLine xmlns="" xmlns:a14="http://schemas.microsoft.com/office/drawing/2010/main" w="9525">
                 <a:solidFill>
                   <a:srgbClr val="000000"/>
                 </a:solidFill>
@@ -396,7 +764,7 @@
             <a:fld id="{08B9EBBA-996F-894A-B54A-D6246ED52CEA}" type="datetimeFigureOut">
               <a:rPr lang="en-US" dirty="0"/>
               <a:pPr/>
-              <a:t>4/30/17</a:t>
+              <a:t>5/2/17</a:t>
             </a:fld>
             <a:endParaRPr lang="en-US" dirty="0"/>
           </a:p>
@@ -711,7 +1079,7 @@
             <a:fld id="{18C79C5D-2A6F-F04D-97DA-BEF2467B64E4}" type="datetimeFigureOut">
               <a:rPr lang="en-US" dirty="0"/>
               <a:pPr/>
-              <a:t>4/30/17</a:t>
+              <a:t>5/2/17</a:t>
             </a:fld>
             <a:endParaRPr lang="en-US" dirty="0"/>
           </a:p>
@@ -1196,7 +1564,7 @@
             <a:fld id="{8DFA1846-DA80-1C48-A609-854EA85C59AD}" type="datetimeFigureOut">
               <a:rPr lang="en-US" dirty="0"/>
               <a:pPr/>
-              <a:t>4/30/17</a:t>
+              <a:t>5/2/17</a:t>
             </a:fld>
             <a:endParaRPr lang="en-US" dirty="0"/>
           </a:p>
@@ -1562,7 +1930,7 @@
             <a:fld id="{FBF54567-0DE4-3F47-BF90-CB84690072F9}" type="datetimeFigureOut">
               <a:rPr lang="en-US" dirty="0"/>
               <a:pPr/>
-              <a:t>4/30/17</a:t>
+              <a:t>5/2/17</a:t>
             </a:fld>
             <a:endParaRPr lang="en-US" dirty="0"/>
           </a:p>
@@ -1713,7 +2081,7 @@
           <a:ln/>
           <a:extLst>
             <a:ext uri="{91240B29-F687-4f45-9708-019B960494DF}">
-              <a14:hiddenLine xmlns:a14="http://schemas.microsoft.com/office/drawing/2010/main" xmlns="" w="9525">
+              <a14:hiddenLine xmlns="" xmlns:a14="http://schemas.microsoft.com/office/drawing/2010/main" w="9525">
                 <a:solidFill>
                   <a:srgbClr val="000000"/>
                 </a:solidFill>
@@ -1832,7 +2200,7 @@
             <a:fld id="{C6C52C72-DE31-F449-A4ED-4C594FD91407}" type="datetimeFigureOut">
               <a:rPr lang="en-US" dirty="0"/>
               <a:pPr/>
-              <a:t>4/30/17</a:t>
+              <a:t>5/2/17</a:t>
             </a:fld>
             <a:endParaRPr lang="en-US" dirty="0"/>
           </a:p>
@@ -1985,7 +2353,7 @@
           <a:ln/>
           <a:extLst>
             <a:ext uri="{91240B29-F687-4f45-9708-019B960494DF}">
-              <a14:hiddenLine xmlns:a14="http://schemas.microsoft.com/office/drawing/2010/main" xmlns="" w="9525">
+              <a14:hiddenLine xmlns="" xmlns:a14="http://schemas.microsoft.com/office/drawing/2010/main" w="9525">
                 <a:solidFill>
                   <a:srgbClr val="000000"/>
                 </a:solidFill>
@@ -2114,7 +2482,7 @@
             <a:fld id="{ED62726E-379B-B349-9EED-81ED093FA806}" type="datetimeFigureOut">
               <a:rPr lang="en-US" dirty="0"/>
               <a:pPr/>
-              <a:t>4/30/17</a:t>
+              <a:t>5/2/17</a:t>
             </a:fld>
             <a:endParaRPr lang="en-US" dirty="0"/>
           </a:p>
@@ -2265,7 +2633,7 @@
           <a:ln/>
           <a:extLst>
             <a:ext uri="{91240B29-F687-4f45-9708-019B960494DF}">
-              <a14:hiddenLine xmlns:a14="http://schemas.microsoft.com/office/drawing/2010/main" xmlns="" w="9525">
+              <a14:hiddenLine xmlns="" xmlns:a14="http://schemas.microsoft.com/office/drawing/2010/main" w="9525">
                 <a:solidFill>
                   <a:srgbClr val="000000"/>
                 </a:solidFill>
@@ -2394,7 +2762,7 @@
             <a:fld id="{9B3A1323-8D79-1946-B0D7-40001CF92E9D}" type="datetimeFigureOut">
               <a:rPr lang="en-US" dirty="0"/>
               <a:pPr/>
-              <a:t>4/30/17</a:t>
+              <a:t>5/2/17</a:t>
             </a:fld>
             <a:endParaRPr lang="en-US" dirty="0"/>
           </a:p>
@@ -2734,7 +3102,7 @@
             <a:fld id="{8DFA1846-DA80-1C48-A609-854EA85C59AD}" type="datetimeFigureOut">
               <a:rPr lang="en-US" dirty="0"/>
               <a:pPr/>
-              <a:t>4/30/17</a:t>
+              <a:t>5/2/17</a:t>
             </a:fld>
             <a:endParaRPr lang="en-US" dirty="0"/>
           </a:p>
@@ -2885,7 +3253,7 @@
           <a:ln/>
           <a:extLst>
             <a:ext uri="{91240B29-F687-4f45-9708-019B960494DF}">
-              <a14:hiddenLine xmlns:a14="http://schemas.microsoft.com/office/drawing/2010/main" xmlns="" w="9525">
+              <a14:hiddenLine xmlns="" xmlns:a14="http://schemas.microsoft.com/office/drawing/2010/main" w="9525">
                 <a:solidFill>
                   <a:srgbClr val="000000"/>
                 </a:solidFill>
@@ -3070,7 +3438,7 @@
             <a:fld id="{57302355-E14B-8545-A8F8-0FE83CC9D524}" type="datetimeFigureOut">
               <a:rPr lang="en-US" dirty="0"/>
               <a:pPr/>
-              <a:t>4/30/17</a:t>
+              <a:t>5/2/17</a:t>
             </a:fld>
             <a:endParaRPr lang="en-US" dirty="0"/>
           </a:p>
@@ -3221,7 +3589,7 @@
           <a:ln/>
           <a:extLst>
             <a:ext uri="{91240B29-F687-4f45-9708-019B960494DF}">
-              <a14:hiddenLine xmlns:a14="http://schemas.microsoft.com/office/drawing/2010/main" xmlns="" w="9525">
+              <a14:hiddenLine xmlns="" xmlns:a14="http://schemas.microsoft.com/office/drawing/2010/main" w="9525">
                 <a:solidFill>
                   <a:srgbClr val="000000"/>
                 </a:solidFill>
@@ -3544,7 +3912,7 @@
             <a:fld id="{02640F58-564D-2B4F-AE67-E407BA4FCF45}" type="datetimeFigureOut">
               <a:rPr lang="en-US" dirty="0"/>
               <a:pPr/>
-              <a:t>4/30/17</a:t>
+              <a:t>5/2/17</a:t>
             </a:fld>
             <a:endParaRPr lang="en-US" dirty="0"/>
           </a:p>
@@ -3695,7 +4063,7 @@
           <a:ln/>
           <a:extLst>
             <a:ext uri="{91240B29-F687-4f45-9708-019B960494DF}">
-              <a14:hiddenLine xmlns:a14="http://schemas.microsoft.com/office/drawing/2010/main" xmlns="" w="9525">
+              <a14:hiddenLine xmlns="" xmlns:a14="http://schemas.microsoft.com/office/drawing/2010/main" w="9525">
                 <a:solidFill>
                   <a:srgbClr val="000000"/>
                 </a:solidFill>
@@ -3762,7 +4130,7 @@
             <a:fld id="{F13A34C8-038E-2045-AF43-DF7DBB8E0E9E}" type="datetimeFigureOut">
               <a:rPr lang="en-US" dirty="0"/>
               <a:pPr/>
-              <a:t>4/30/17</a:t>
+              <a:t>5/2/17</a:t>
             </a:fld>
             <a:endParaRPr lang="en-US" dirty="0"/>
           </a:p>
@@ -3854,7 +4222,7 @@
             <a:fld id="{8818C68F-D26B-8F47-958C-23B49CF8A634}" type="datetimeFigureOut">
               <a:rPr lang="en-US" dirty="0"/>
               <a:pPr/>
-              <a:t>4/30/17</a:t>
+              <a:t>5/2/17</a:t>
             </a:fld>
             <a:endParaRPr lang="en-US" dirty="0"/>
           </a:p>
@@ -4118,7 +4486,7 @@
           <a:ln/>
           <a:extLst>
             <a:ext uri="{91240B29-F687-4f45-9708-019B960494DF}">
-              <a14:hiddenLine xmlns:a14="http://schemas.microsoft.com/office/drawing/2010/main" xmlns="" w="9525">
+              <a14:hiddenLine xmlns="" xmlns:a14="http://schemas.microsoft.com/office/drawing/2010/main" w="9525">
                 <a:solidFill>
                   <a:srgbClr val="000000"/>
                 </a:solidFill>
@@ -4318,7 +4686,7 @@
             <a:fld id="{D0DF5E60-9974-AC48-9591-99C2BB44B7CF}" type="datetimeFigureOut">
               <a:rPr lang="en-US" dirty="0"/>
               <a:pPr/>
-              <a:t>4/30/17</a:t>
+              <a:t>5/2/17</a:t>
             </a:fld>
             <a:endParaRPr lang="en-US" dirty="0"/>
           </a:p>
@@ -4628,7 +4996,7 @@
             <a:fld id="{18C79C5D-2A6F-F04D-97DA-BEF2467B64E4}" type="datetimeFigureOut">
               <a:rPr lang="en-US" dirty="0"/>
               <a:pPr/>
-              <a:t>4/30/17</a:t>
+              <a:t>5/2/17</a:t>
             </a:fld>
             <a:endParaRPr lang="en-US" dirty="0"/>
           </a:p>
@@ -4895,7 +5263,7 @@
             <a:fld id="{09B482E8-6E0E-1B4F-B1FD-C69DB9E858D9}" type="datetimeFigureOut">
               <a:rPr lang="en-US" dirty="0"/>
               <a:pPr/>
-              <a:t>4/30/17</a:t>
+              <a:t>5/2/17</a:t>
             </a:fld>
             <a:endParaRPr lang="en-US" dirty="0"/>
           </a:p>
@@ -5379,7 +5747,18 @@
           <a:bodyPr/>
           <a:lstStyle/>
           <a:p>
-            <a:endParaRPr lang="en-US"/>
+            <a:r>
+              <a:rPr lang="en-US" dirty="0" smtClean="0"/>
+              <a:t>Learning how to use </a:t>
+            </a:r>
+            <a:r>
+              <a:rPr lang="en-US" dirty="0" err="1" smtClean="0"/>
+              <a:t>Array.prototype.map</a:t>
+            </a:r>
+            <a:r>
+              <a:rPr lang="en-US" dirty="0"/>
+              <a:t>.</a:t>
+            </a:r>
           </a:p>
         </p:txBody>
       </p:sp>
@@ -5387,6 +5766,355 @@
     <p:extLst>
       <p:ext uri="{BB962C8B-B14F-4D97-AF65-F5344CB8AC3E}">
         <p14:creationId xmlns:p14="http://schemas.microsoft.com/office/powerpoint/2010/main" val="39440780"/>
+      </p:ext>
+    </p:extLst>
+  </p:cSld>
+  <p:clrMapOvr>
+    <a:masterClrMapping/>
+  </p:clrMapOvr>
+</p:sld>
+</file>
+
+<file path=ppt/slides/slide10.xml><?xml version="1.0" encoding="utf-8"?>
+<p:sld xmlns:a="http://schemas.openxmlformats.org/drawingml/2006/main" xmlns:r="http://schemas.openxmlformats.org/officeDocument/2006/relationships" xmlns:p="http://schemas.openxmlformats.org/presentationml/2006/main">
+  <p:cSld>
+    <p:spTree>
+      <p:nvGrpSpPr>
+        <p:cNvPr id="1" name=""/>
+        <p:cNvGrpSpPr/>
+        <p:nvPr/>
+      </p:nvGrpSpPr>
+      <p:grpSpPr>
+        <a:xfrm>
+          <a:off x="0" y="0"/>
+          <a:ext cx="0" cy="0"/>
+          <a:chOff x="0" y="0"/>
+          <a:chExt cx="0" cy="0"/>
+        </a:xfrm>
+      </p:grpSpPr>
+      <p:sp>
+        <p:nvSpPr>
+          <p:cNvPr id="2" name="Title 1"/>
+          <p:cNvSpPr>
+            <a:spLocks noGrp="1"/>
+          </p:cNvSpPr>
+          <p:nvPr>
+            <p:ph type="title"/>
+          </p:nvPr>
+        </p:nvSpPr>
+        <p:spPr/>
+        <p:txBody>
+          <a:bodyPr/>
+          <a:lstStyle/>
+          <a:p>
+            <a:r>
+              <a:rPr lang="en-US" dirty="0" smtClean="0"/>
+              <a:t>Example Of a Map Function</a:t>
+            </a:r>
+            <a:endParaRPr lang="en-US" dirty="0"/>
+          </a:p>
+        </p:txBody>
+      </p:sp>
+      <p:sp>
+        <p:nvSpPr>
+          <p:cNvPr id="3" name="Content Placeholder 2"/>
+          <p:cNvSpPr>
+            <a:spLocks noGrp="1"/>
+          </p:cNvSpPr>
+          <p:nvPr>
+            <p:ph idx="1"/>
+          </p:nvPr>
+        </p:nvSpPr>
+        <p:spPr/>
+        <p:txBody>
+          <a:bodyPr/>
+          <a:lstStyle/>
+          <a:p>
+            <a:pPr>
+              <a:buFont typeface="+mj-lt"/>
+              <a:buAutoNum type="arabicPeriod"/>
+            </a:pPr>
+            <a:r>
+              <a:rPr lang="en-US" dirty="0">
+                <a:hlinkClick r:id="rId2"/>
+              </a:rPr>
+              <a:t>https://</a:t>
+            </a:r>
+            <a:r>
+              <a:rPr lang="en-US" dirty="0" smtClean="0">
+                <a:hlinkClick r:id="rId2"/>
+              </a:rPr>
+              <a:t>jsbin.com/nadija/3/edit?js,console</a:t>
+            </a:r>
+            <a:r>
+              <a:rPr lang="en-US" dirty="0" smtClean="0"/>
+              <a:t> (</a:t>
+            </a:r>
+            <a:r>
+              <a:rPr lang="en-US" dirty="0"/>
+              <a:t>Multiplying Numbers)</a:t>
+            </a:r>
+          </a:p>
+          <a:p>
+            <a:pPr>
+              <a:buFont typeface="+mj-lt"/>
+              <a:buAutoNum type="arabicPeriod"/>
+            </a:pPr>
+            <a:r>
+              <a:rPr lang="en-US" dirty="0">
+                <a:hlinkClick r:id="rId3"/>
+              </a:rPr>
+              <a:t>https://jsbin.com/nadija/4/edit?js,console</a:t>
+            </a:r>
+            <a:r>
+              <a:rPr lang="en-US" dirty="0"/>
+              <a:t> (Return Full Names)</a:t>
+            </a:r>
+            <a:endParaRPr lang="en-US" dirty="0"/>
+          </a:p>
+        </p:txBody>
+      </p:sp>
+    </p:spTree>
+    <p:extLst>
+      <p:ext uri="{BB962C8B-B14F-4D97-AF65-F5344CB8AC3E}">
+        <p14:creationId xmlns:p14="http://schemas.microsoft.com/office/powerpoint/2010/main" val="208012691"/>
+      </p:ext>
+    </p:extLst>
+  </p:cSld>
+  <p:clrMapOvr>
+    <a:masterClrMapping/>
+  </p:clrMapOvr>
+</p:sld>
+</file>
+
+<file path=ppt/slides/slide11.xml><?xml version="1.0" encoding="utf-8"?>
+<p:sld xmlns:a="http://schemas.openxmlformats.org/drawingml/2006/main" xmlns:r="http://schemas.openxmlformats.org/officeDocument/2006/relationships" xmlns:p="http://schemas.openxmlformats.org/presentationml/2006/main">
+  <p:cSld>
+    <p:spTree>
+      <p:nvGrpSpPr>
+        <p:cNvPr id="1" name=""/>
+        <p:cNvGrpSpPr/>
+        <p:nvPr/>
+      </p:nvGrpSpPr>
+      <p:grpSpPr>
+        <a:xfrm>
+          <a:off x="0" y="0"/>
+          <a:ext cx="0" cy="0"/>
+          <a:chOff x="0" y="0"/>
+          <a:chExt cx="0" cy="0"/>
+        </a:xfrm>
+      </p:grpSpPr>
+      <p:sp>
+        <p:nvSpPr>
+          <p:cNvPr id="2" name="Title 1"/>
+          <p:cNvSpPr>
+            <a:spLocks noGrp="1"/>
+          </p:cNvSpPr>
+          <p:nvPr>
+            <p:ph type="title"/>
+          </p:nvPr>
+        </p:nvSpPr>
+        <p:spPr/>
+        <p:txBody>
+          <a:bodyPr/>
+          <a:lstStyle/>
+          <a:p>
+            <a:r>
+              <a:rPr lang="en-US" dirty="0"/>
+              <a:t>Map Function Untangled</a:t>
+            </a:r>
+          </a:p>
+        </p:txBody>
+      </p:sp>
+      <p:sp>
+        <p:nvSpPr>
+          <p:cNvPr id="3" name="Content Placeholder 2"/>
+          <p:cNvSpPr>
+            <a:spLocks noGrp="1"/>
+          </p:cNvSpPr>
+          <p:nvPr>
+            <p:ph idx="1"/>
+          </p:nvPr>
+        </p:nvSpPr>
+        <p:spPr/>
+        <p:txBody>
+          <a:bodyPr/>
+          <a:lstStyle/>
+          <a:p>
+            <a:pPr>
+              <a:buFont typeface="+mj-lt"/>
+              <a:buAutoNum type="arabicPeriod"/>
+            </a:pPr>
+            <a:r>
+              <a:rPr lang="en-US" dirty="0" smtClean="0">
+                <a:hlinkClick r:id="rId2"/>
+              </a:rPr>
+              <a:t>https://jsbin.com/nadija/6/edit?js,console</a:t>
+            </a:r>
+            <a:r>
+              <a:rPr lang="en-US" dirty="0" smtClean="0"/>
+              <a:t> (For Loop Example)</a:t>
+            </a:r>
+            <a:endParaRPr lang="en-US" dirty="0"/>
+          </a:p>
+        </p:txBody>
+      </p:sp>
+    </p:spTree>
+    <p:extLst>
+      <p:ext uri="{BB962C8B-B14F-4D97-AF65-F5344CB8AC3E}">
+        <p14:creationId xmlns:p14="http://schemas.microsoft.com/office/powerpoint/2010/main" val="188367650"/>
+      </p:ext>
+    </p:extLst>
+  </p:cSld>
+  <p:clrMapOvr>
+    <a:masterClrMapping/>
+  </p:clrMapOvr>
+</p:sld>
+</file>
+
+<file path=ppt/slides/slide12.xml><?xml version="1.0" encoding="utf-8"?>
+<p:sld xmlns:a="http://schemas.openxmlformats.org/drawingml/2006/main" xmlns:r="http://schemas.openxmlformats.org/officeDocument/2006/relationships" xmlns:p="http://schemas.openxmlformats.org/presentationml/2006/main">
+  <p:cSld>
+    <p:spTree>
+      <p:nvGrpSpPr>
+        <p:cNvPr id="1" name=""/>
+        <p:cNvGrpSpPr/>
+        <p:nvPr/>
+      </p:nvGrpSpPr>
+      <p:grpSpPr>
+        <a:xfrm>
+          <a:off x="0" y="0"/>
+          <a:ext cx="0" cy="0"/>
+          <a:chOff x="0" y="0"/>
+          <a:chExt cx="0" cy="0"/>
+        </a:xfrm>
+      </p:grpSpPr>
+      <p:sp>
+        <p:nvSpPr>
+          <p:cNvPr id="2" name="Title 1"/>
+          <p:cNvSpPr>
+            <a:spLocks noGrp="1"/>
+          </p:cNvSpPr>
+          <p:nvPr>
+            <p:ph type="title"/>
+          </p:nvPr>
+        </p:nvSpPr>
+        <p:spPr/>
+        <p:txBody>
+          <a:bodyPr/>
+          <a:lstStyle/>
+          <a:p>
+            <a:r>
+              <a:rPr lang="en-US" dirty="0" smtClean="0"/>
+              <a:t>Try it Out Yourself (Map)</a:t>
+            </a:r>
+            <a:endParaRPr lang="en-US" dirty="0"/>
+          </a:p>
+        </p:txBody>
+      </p:sp>
+      <p:sp>
+        <p:nvSpPr>
+          <p:cNvPr id="3" name="Content Placeholder 2"/>
+          <p:cNvSpPr>
+            <a:spLocks noGrp="1"/>
+          </p:cNvSpPr>
+          <p:nvPr>
+            <p:ph idx="1"/>
+          </p:nvPr>
+        </p:nvSpPr>
+        <p:spPr/>
+        <p:txBody>
+          <a:bodyPr/>
+          <a:lstStyle/>
+          <a:p>
+            <a:pPr>
+              <a:buFont typeface="+mj-lt"/>
+              <a:buAutoNum type="arabicPeriod"/>
+            </a:pPr>
+            <a:r>
+              <a:rPr lang="en-US" dirty="0"/>
+              <a:t>Using this JS Bin </a:t>
+            </a:r>
+            <a:r>
+              <a:rPr lang="en-US" dirty="0" smtClean="0"/>
+              <a:t>(</a:t>
+            </a:r>
+            <a:r>
+              <a:rPr lang="en-US" dirty="0" smtClean="0">
+                <a:hlinkClick r:id="rId2"/>
+              </a:rPr>
+              <a:t>https://jsbin.com/tevorot/5/edit?js,console</a:t>
+            </a:r>
+            <a:r>
+              <a:rPr lang="en-US" dirty="0" smtClean="0"/>
+              <a:t>) rewrite this using map.</a:t>
+            </a:r>
+          </a:p>
+          <a:p>
+            <a:pPr>
+              <a:buFont typeface="+mj-lt"/>
+              <a:buAutoNum type="arabicPeriod"/>
+            </a:pPr>
+            <a:r>
+              <a:rPr lang="en-US" dirty="0" smtClean="0"/>
+              <a:t>Using </a:t>
+            </a:r>
+            <a:r>
+              <a:rPr lang="en-US" dirty="0"/>
+              <a:t>a blank JS Bin (</a:t>
+            </a:r>
+            <a:r>
+              <a:rPr lang="en-US" dirty="0">
+                <a:hlinkClick r:id="rId3"/>
+              </a:rPr>
+              <a:t>https://</a:t>
+            </a:r>
+            <a:r>
+              <a:rPr lang="en-US" dirty="0" smtClean="0">
+                <a:hlinkClick r:id="rId3"/>
+              </a:rPr>
+              <a:t>jsbin.com/tevorot/2/edit?js,console)</a:t>
+            </a:r>
+            <a:r>
+              <a:rPr lang="en-US" dirty="0" smtClean="0"/>
+              <a:t> write a map function to get the expected output.</a:t>
+            </a:r>
+          </a:p>
+          <a:p>
+            <a:pPr>
+              <a:buFont typeface="+mj-lt"/>
+              <a:buAutoNum type="arabicPeriod"/>
+            </a:pPr>
+            <a:r>
+              <a:rPr lang="en-US" dirty="0" smtClean="0"/>
+              <a:t> </a:t>
+            </a:r>
+            <a:r>
+              <a:rPr lang="en-US" dirty="0"/>
+              <a:t>Using a blank JS Bin (</a:t>
+            </a:r>
+            <a:r>
+              <a:rPr lang="en-US" dirty="0">
+                <a:hlinkClick r:id="rId4"/>
+              </a:rPr>
+              <a:t>https://jsbin.com/?js,console</a:t>
+            </a:r>
+            <a:r>
+              <a:rPr lang="en-US" dirty="0"/>
+              <a:t>) </a:t>
+            </a:r>
+            <a:r>
+              <a:rPr lang="en-US" dirty="0" smtClean="0"/>
+              <a:t>create an array and modify it using the map function.</a:t>
+            </a:r>
+            <a:endParaRPr lang="en-US" dirty="0"/>
+          </a:p>
+        </p:txBody>
+      </p:sp>
+    </p:spTree>
+    <p:extLst>
+      <p:ext uri="{BB962C8B-B14F-4D97-AF65-F5344CB8AC3E}">
+        <p14:creationId xmlns:p14="http://schemas.microsoft.com/office/powerpoint/2010/main" val="503423354"/>
       </p:ext>
     </p:extLst>
   </p:cSld>
@@ -5428,7 +6156,11 @@
           <a:bodyPr/>
           <a:lstStyle/>
           <a:p>
-            <a:endParaRPr lang="en-US"/>
+            <a:r>
+              <a:rPr lang="en-US" dirty="0" smtClean="0"/>
+              <a:t>Assumptions</a:t>
+            </a:r>
+            <a:endParaRPr lang="en-US" dirty="0"/>
           </a:p>
         </p:txBody>
       </p:sp>
@@ -5447,7 +6179,99 @@
           <a:bodyPr/>
           <a:lstStyle/>
           <a:p>
-            <a:endParaRPr lang="en-US"/>
+            <a:r>
+              <a:rPr lang="en-US" dirty="0" smtClean="0"/>
+              <a:t>You have been working in an Object Oriented Language for the last 2 - 3 years.</a:t>
+            </a:r>
+          </a:p>
+          <a:p>
+            <a:r>
+              <a:rPr lang="en-US" dirty="0" smtClean="0"/>
+              <a:t>You understand how to invoke a function within JavaScript.</a:t>
+            </a:r>
+            <a:endParaRPr lang="en-US" dirty="0"/>
+          </a:p>
+        </p:txBody>
+      </p:sp>
+    </p:spTree>
+    <p:extLst>
+      <p:ext uri="{BB962C8B-B14F-4D97-AF65-F5344CB8AC3E}">
+        <p14:creationId xmlns:p14="http://schemas.microsoft.com/office/powerpoint/2010/main" val="997587051"/>
+      </p:ext>
+    </p:extLst>
+  </p:cSld>
+  <p:clrMapOvr>
+    <a:masterClrMapping/>
+  </p:clrMapOvr>
+</p:sld>
+</file>
+
+<file path=ppt/slides/slide3.xml><?xml version="1.0" encoding="utf-8"?>
+<p:sld xmlns:a="http://schemas.openxmlformats.org/drawingml/2006/main" xmlns:r="http://schemas.openxmlformats.org/officeDocument/2006/relationships" xmlns:p="http://schemas.openxmlformats.org/presentationml/2006/main">
+  <p:cSld>
+    <p:spTree>
+      <p:nvGrpSpPr>
+        <p:cNvPr id="1" name=""/>
+        <p:cNvGrpSpPr/>
+        <p:nvPr/>
+      </p:nvGrpSpPr>
+      <p:grpSpPr>
+        <a:xfrm>
+          <a:off x="0" y="0"/>
+          <a:ext cx="0" cy="0"/>
+          <a:chOff x="0" y="0"/>
+          <a:chExt cx="0" cy="0"/>
+        </a:xfrm>
+      </p:grpSpPr>
+      <p:sp>
+        <p:nvSpPr>
+          <p:cNvPr id="2" name="Title 1"/>
+          <p:cNvSpPr>
+            <a:spLocks noGrp="1"/>
+          </p:cNvSpPr>
+          <p:nvPr>
+            <p:ph type="title"/>
+          </p:nvPr>
+        </p:nvSpPr>
+        <p:spPr/>
+        <p:txBody>
+          <a:bodyPr/>
+          <a:lstStyle/>
+          <a:p>
+            <a:r>
+              <a:rPr lang="en-US" dirty="0" smtClean="0"/>
+              <a:t>Objective</a:t>
+            </a:r>
+            <a:endParaRPr lang="en-US" dirty="0"/>
+          </a:p>
+        </p:txBody>
+      </p:sp>
+      <p:sp>
+        <p:nvSpPr>
+          <p:cNvPr id="3" name="Content Placeholder 2"/>
+          <p:cNvSpPr>
+            <a:spLocks noGrp="1"/>
+          </p:cNvSpPr>
+          <p:nvPr>
+            <p:ph idx="1"/>
+          </p:nvPr>
+        </p:nvSpPr>
+        <p:spPr/>
+        <p:txBody>
+          <a:bodyPr/>
+          <a:lstStyle/>
+          <a:p>
+            <a:r>
+              <a:rPr lang="en-US" dirty="0" smtClean="0"/>
+              <a:t>Pass a function into another function as an argument.</a:t>
+            </a:r>
+          </a:p>
+          <a:p>
+            <a:r>
+              <a:rPr lang="en-US" dirty="0" smtClean="0"/>
+              <a:t>Write a statement that uses JavaScript's map function to transform an array. </a:t>
+            </a:r>
+            <a:endParaRPr lang="en-US" dirty="0"/>
           </a:p>
         </p:txBody>
       </p:sp>
@@ -5455,6 +6279,615 @@
     <p:extLst>
       <p:ext uri="{BB962C8B-B14F-4D97-AF65-F5344CB8AC3E}">
         <p14:creationId xmlns:p14="http://schemas.microsoft.com/office/powerpoint/2010/main" val="1456226184"/>
+      </p:ext>
+    </p:extLst>
+  </p:cSld>
+  <p:clrMapOvr>
+    <a:masterClrMapping/>
+  </p:clrMapOvr>
+</p:sld>
+</file>
+
+<file path=ppt/slides/slide4.xml><?xml version="1.0" encoding="utf-8"?>
+<p:sld xmlns:a="http://schemas.openxmlformats.org/drawingml/2006/main" xmlns:r="http://schemas.openxmlformats.org/officeDocument/2006/relationships" xmlns:p="http://schemas.openxmlformats.org/presentationml/2006/main">
+  <p:cSld>
+    <p:spTree>
+      <p:nvGrpSpPr>
+        <p:cNvPr id="1" name=""/>
+        <p:cNvGrpSpPr/>
+        <p:nvPr/>
+      </p:nvGrpSpPr>
+      <p:grpSpPr>
+        <a:xfrm>
+          <a:off x="0" y="0"/>
+          <a:ext cx="0" cy="0"/>
+          <a:chOff x="0" y="0"/>
+          <a:chExt cx="0" cy="0"/>
+        </a:xfrm>
+      </p:grpSpPr>
+      <p:sp>
+        <p:nvSpPr>
+          <p:cNvPr id="2" name="Title 1"/>
+          <p:cNvSpPr>
+            <a:spLocks noGrp="1"/>
+          </p:cNvSpPr>
+          <p:nvPr>
+            <p:ph type="title"/>
+          </p:nvPr>
+        </p:nvSpPr>
+        <p:spPr/>
+        <p:txBody>
+          <a:bodyPr/>
+          <a:lstStyle/>
+          <a:p>
+            <a:r>
+              <a:rPr lang="en-US" dirty="0" smtClean="0"/>
+              <a:t>What is a Callback Function</a:t>
+            </a:r>
+            <a:endParaRPr lang="en-US" dirty="0"/>
+          </a:p>
+        </p:txBody>
+      </p:sp>
+      <p:sp>
+        <p:nvSpPr>
+          <p:cNvPr id="3" name="Content Placeholder 2"/>
+          <p:cNvSpPr>
+            <a:spLocks noGrp="1"/>
+          </p:cNvSpPr>
+          <p:nvPr>
+            <p:ph idx="1"/>
+          </p:nvPr>
+        </p:nvSpPr>
+        <p:spPr/>
+        <p:txBody>
+          <a:bodyPr/>
+          <a:lstStyle/>
+          <a:p>
+            <a:r>
+              <a:rPr lang="en-US" dirty="0" smtClean="0"/>
+              <a:t>A function that is passed into another function as an argument, and called within that function.</a:t>
+            </a:r>
+            <a:endParaRPr lang="en-US" dirty="0"/>
+          </a:p>
+        </p:txBody>
+      </p:sp>
+    </p:spTree>
+    <p:extLst>
+      <p:ext uri="{BB962C8B-B14F-4D97-AF65-F5344CB8AC3E}">
+        <p14:creationId xmlns:p14="http://schemas.microsoft.com/office/powerpoint/2010/main" val="1455267248"/>
+      </p:ext>
+    </p:extLst>
+  </p:cSld>
+  <p:clrMapOvr>
+    <a:masterClrMapping/>
+  </p:clrMapOvr>
+</p:sld>
+</file>
+
+<file path=ppt/slides/slide5.xml><?xml version="1.0" encoding="utf-8"?>
+<p:sld xmlns:a="http://schemas.openxmlformats.org/drawingml/2006/main" xmlns:r="http://schemas.openxmlformats.org/officeDocument/2006/relationships" xmlns:p="http://schemas.openxmlformats.org/presentationml/2006/main">
+  <p:cSld>
+    <p:spTree>
+      <p:nvGrpSpPr>
+        <p:cNvPr id="1" name=""/>
+        <p:cNvGrpSpPr/>
+        <p:nvPr/>
+      </p:nvGrpSpPr>
+      <p:grpSpPr>
+        <a:xfrm>
+          <a:off x="0" y="0"/>
+          <a:ext cx="0" cy="0"/>
+          <a:chOff x="0" y="0"/>
+          <a:chExt cx="0" cy="0"/>
+        </a:xfrm>
+      </p:grpSpPr>
+      <p:sp>
+        <p:nvSpPr>
+          <p:cNvPr id="2" name="Title 1"/>
+          <p:cNvSpPr>
+            <a:spLocks noGrp="1"/>
+          </p:cNvSpPr>
+          <p:nvPr>
+            <p:ph type="title"/>
+          </p:nvPr>
+        </p:nvSpPr>
+        <p:spPr/>
+        <p:txBody>
+          <a:bodyPr/>
+          <a:lstStyle/>
+          <a:p>
+            <a:r>
+              <a:rPr lang="en-US" dirty="0" smtClean="0"/>
+              <a:t>Example Of a Callback Function</a:t>
+            </a:r>
+            <a:endParaRPr lang="en-US" dirty="0"/>
+          </a:p>
+        </p:txBody>
+      </p:sp>
+      <p:sp>
+        <p:nvSpPr>
+          <p:cNvPr id="3" name="Content Placeholder 2"/>
+          <p:cNvSpPr>
+            <a:spLocks noGrp="1"/>
+          </p:cNvSpPr>
+          <p:nvPr>
+            <p:ph idx="1"/>
+          </p:nvPr>
+        </p:nvSpPr>
+        <p:spPr/>
+        <p:txBody>
+          <a:bodyPr/>
+          <a:lstStyle/>
+          <a:p>
+            <a:pPr>
+              <a:buFont typeface="+mj-lt"/>
+              <a:buAutoNum type="arabicPeriod"/>
+            </a:pPr>
+            <a:r>
+              <a:rPr lang="en-US" dirty="0" smtClean="0">
+                <a:hlinkClick r:id="rId2"/>
+              </a:rPr>
+              <a:t>https</a:t>
+            </a:r>
+            <a:r>
+              <a:rPr lang="en-US" dirty="0">
+                <a:hlinkClick r:id="rId2"/>
+              </a:rPr>
+              <a:t>://</a:t>
+            </a:r>
+            <a:r>
+              <a:rPr lang="en-US" dirty="0" smtClean="0">
+                <a:hlinkClick r:id="rId2"/>
+              </a:rPr>
+              <a:t>jsbin.com/nadija/2/edit?js,console</a:t>
+            </a:r>
+            <a:r>
+              <a:rPr lang="en-US" dirty="0" smtClean="0"/>
+              <a:t> (Basic Callback Function)</a:t>
+            </a:r>
+          </a:p>
+          <a:p>
+            <a:pPr>
+              <a:buFont typeface="+mj-lt"/>
+              <a:buAutoNum type="arabicPeriod"/>
+            </a:pPr>
+            <a:r>
+              <a:rPr lang="en-US" dirty="0">
+                <a:hlinkClick r:id="rId3"/>
+              </a:rPr>
+              <a:t>https://</a:t>
+            </a:r>
+            <a:r>
+              <a:rPr lang="en-US" dirty="0" smtClean="0">
+                <a:hlinkClick r:id="rId3"/>
+              </a:rPr>
+              <a:t>jsbin.com/nadija/5/edit?js,console</a:t>
+            </a:r>
+            <a:r>
+              <a:rPr lang="en-US" dirty="0" smtClean="0"/>
+              <a:t> (</a:t>
+            </a:r>
+            <a:r>
+              <a:rPr lang="en-US" dirty="0"/>
+              <a:t>Asynchronous </a:t>
+            </a:r>
+            <a:r>
+              <a:rPr lang="en-US" dirty="0" smtClean="0"/>
+              <a:t>Callback Function</a:t>
+            </a:r>
+            <a:r>
+              <a:rPr lang="en-US" dirty="0"/>
+              <a:t>)</a:t>
+            </a:r>
+          </a:p>
+          <a:p>
+            <a:pPr>
+              <a:buFont typeface="+mj-lt"/>
+              <a:buAutoNum type="arabicPeriod"/>
+            </a:pPr>
+            <a:endParaRPr lang="en-US" dirty="0"/>
+          </a:p>
+        </p:txBody>
+      </p:sp>
+    </p:spTree>
+    <p:extLst>
+      <p:ext uri="{BB962C8B-B14F-4D97-AF65-F5344CB8AC3E}">
+        <p14:creationId xmlns:p14="http://schemas.microsoft.com/office/powerpoint/2010/main" val="1569254768"/>
+      </p:ext>
+    </p:extLst>
+  </p:cSld>
+  <p:clrMapOvr>
+    <a:masterClrMapping/>
+  </p:clrMapOvr>
+</p:sld>
+</file>
+
+<file path=ppt/slides/slide6.xml><?xml version="1.0" encoding="utf-8"?>
+<p:sld xmlns:a="http://schemas.openxmlformats.org/drawingml/2006/main" xmlns:r="http://schemas.openxmlformats.org/officeDocument/2006/relationships" xmlns:p="http://schemas.openxmlformats.org/presentationml/2006/main">
+  <p:cSld>
+    <p:spTree>
+      <p:nvGrpSpPr>
+        <p:cNvPr id="1" name=""/>
+        <p:cNvGrpSpPr/>
+        <p:nvPr/>
+      </p:nvGrpSpPr>
+      <p:grpSpPr>
+        <a:xfrm>
+          <a:off x="0" y="0"/>
+          <a:ext cx="0" cy="0"/>
+          <a:chOff x="0" y="0"/>
+          <a:chExt cx="0" cy="0"/>
+        </a:xfrm>
+      </p:grpSpPr>
+      <p:sp>
+        <p:nvSpPr>
+          <p:cNvPr id="2" name="Title 1"/>
+          <p:cNvSpPr>
+            <a:spLocks noGrp="1"/>
+          </p:cNvSpPr>
+          <p:nvPr>
+            <p:ph type="title"/>
+          </p:nvPr>
+        </p:nvSpPr>
+        <p:spPr/>
+        <p:txBody>
+          <a:bodyPr/>
+          <a:lstStyle/>
+          <a:p>
+            <a:r>
+              <a:rPr lang="en-US" dirty="0" smtClean="0"/>
+              <a:t>Lets Write A Callback Together</a:t>
+            </a:r>
+            <a:endParaRPr lang="en-US" dirty="0"/>
+          </a:p>
+        </p:txBody>
+      </p:sp>
+      <p:sp>
+        <p:nvSpPr>
+          <p:cNvPr id="3" name="Content Placeholder 2"/>
+          <p:cNvSpPr>
+            <a:spLocks noGrp="1"/>
+          </p:cNvSpPr>
+          <p:nvPr>
+            <p:ph idx="1"/>
+          </p:nvPr>
+        </p:nvSpPr>
+        <p:spPr/>
+        <p:txBody>
+          <a:bodyPr/>
+          <a:lstStyle/>
+          <a:p>
+            <a:pPr>
+              <a:buFont typeface="+mj-lt"/>
+              <a:buAutoNum type="arabicPeriod"/>
+            </a:pPr>
+            <a:r>
+              <a:rPr lang="en-US" dirty="0">
+                <a:hlinkClick r:id="rId2"/>
+              </a:rPr>
+              <a:t>https://</a:t>
+            </a:r>
+            <a:r>
+              <a:rPr lang="en-US" dirty="0" smtClean="0">
+                <a:hlinkClick r:id="rId2"/>
+              </a:rPr>
+              <a:t>jsbin.com/hiropi/edit?js,console</a:t>
+            </a:r>
+            <a:endParaRPr lang="en-US" dirty="0"/>
+          </a:p>
+        </p:txBody>
+      </p:sp>
+    </p:spTree>
+    <p:extLst>
+      <p:ext uri="{BB962C8B-B14F-4D97-AF65-F5344CB8AC3E}">
+        <p14:creationId xmlns:p14="http://schemas.microsoft.com/office/powerpoint/2010/main" val="1900376556"/>
+      </p:ext>
+    </p:extLst>
+  </p:cSld>
+  <p:clrMapOvr>
+    <a:masterClrMapping/>
+  </p:clrMapOvr>
+</p:sld>
+</file>
+
+<file path=ppt/slides/slide7.xml><?xml version="1.0" encoding="utf-8"?>
+<p:sld xmlns:a="http://schemas.openxmlformats.org/drawingml/2006/main" xmlns:r="http://schemas.openxmlformats.org/officeDocument/2006/relationships" xmlns:p="http://schemas.openxmlformats.org/presentationml/2006/main">
+  <p:cSld>
+    <p:spTree>
+      <p:nvGrpSpPr>
+        <p:cNvPr id="1" name=""/>
+        <p:cNvGrpSpPr/>
+        <p:nvPr/>
+      </p:nvGrpSpPr>
+      <p:grpSpPr>
+        <a:xfrm>
+          <a:off x="0" y="0"/>
+          <a:ext cx="0" cy="0"/>
+          <a:chOff x="0" y="0"/>
+          <a:chExt cx="0" cy="0"/>
+        </a:xfrm>
+      </p:grpSpPr>
+      <p:sp>
+        <p:nvSpPr>
+          <p:cNvPr id="2" name="Title 1"/>
+          <p:cNvSpPr>
+            <a:spLocks noGrp="1"/>
+          </p:cNvSpPr>
+          <p:nvPr>
+            <p:ph type="title"/>
+          </p:nvPr>
+        </p:nvSpPr>
+        <p:spPr/>
+        <p:txBody>
+          <a:bodyPr/>
+          <a:lstStyle/>
+          <a:p>
+            <a:r>
+              <a:rPr lang="en-US" dirty="0" smtClean="0"/>
+              <a:t>Try it Out Yourself (Callback)</a:t>
+            </a:r>
+            <a:endParaRPr lang="en-US" dirty="0"/>
+          </a:p>
+        </p:txBody>
+      </p:sp>
+      <p:sp>
+        <p:nvSpPr>
+          <p:cNvPr id="3" name="Content Placeholder 2"/>
+          <p:cNvSpPr>
+            <a:spLocks noGrp="1"/>
+          </p:cNvSpPr>
+          <p:nvPr>
+            <p:ph idx="1"/>
+          </p:nvPr>
+        </p:nvSpPr>
+        <p:spPr/>
+        <p:txBody>
+          <a:bodyPr/>
+          <a:lstStyle/>
+          <a:p>
+            <a:pPr>
+              <a:buFont typeface="+mj-lt"/>
+              <a:buAutoNum type="arabicPeriod"/>
+            </a:pPr>
+            <a:r>
+              <a:rPr lang="en-US" dirty="0"/>
+              <a:t>Using this JS Bin (</a:t>
+            </a:r>
+            <a:r>
+              <a:rPr lang="en-US" dirty="0">
+                <a:hlinkClick r:id="rId2"/>
+              </a:rPr>
+              <a:t>https://</a:t>
+            </a:r>
+            <a:r>
+              <a:rPr lang="en-US" dirty="0" smtClean="0">
+                <a:hlinkClick r:id="rId2"/>
+              </a:rPr>
+              <a:t>jsbin.com/zososet/1/edit?js,console</a:t>
+            </a:r>
+            <a:r>
+              <a:rPr lang="en-US" dirty="0" smtClean="0"/>
+              <a:t>) pass a function is as an argument.</a:t>
+            </a:r>
+            <a:endParaRPr lang="en-US" dirty="0"/>
+          </a:p>
+          <a:p>
+            <a:pPr>
+              <a:buFont typeface="+mj-lt"/>
+              <a:buAutoNum type="arabicPeriod"/>
+            </a:pPr>
+            <a:r>
+              <a:rPr lang="en-US" dirty="0" smtClean="0"/>
+              <a:t>Using </a:t>
+            </a:r>
+            <a:r>
+              <a:rPr lang="en-US" dirty="0"/>
+              <a:t>a blank JS </a:t>
+            </a:r>
+            <a:r>
+              <a:rPr lang="en-US" dirty="0" smtClean="0"/>
+              <a:t>Bin (</a:t>
+            </a:r>
+            <a:r>
+              <a:rPr lang="en-US" dirty="0" smtClean="0">
+                <a:hlinkClick r:id="rId3"/>
+              </a:rPr>
+              <a:t>https</a:t>
+            </a:r>
+            <a:r>
+              <a:rPr lang="en-US" dirty="0">
+                <a:hlinkClick r:id="rId3"/>
+              </a:rPr>
+              <a:t>://jsbin.com/?</a:t>
+            </a:r>
+            <a:r>
+              <a:rPr lang="en-US" dirty="0" smtClean="0">
+                <a:hlinkClick r:id="rId3"/>
+              </a:rPr>
+              <a:t>js,console</a:t>
+            </a:r>
+            <a:r>
+              <a:rPr lang="en-US" dirty="0" smtClean="0"/>
+              <a:t>) write a function that takes in another function as an argument. </a:t>
+            </a:r>
+            <a:endParaRPr lang="en-US" dirty="0"/>
+          </a:p>
+        </p:txBody>
+      </p:sp>
+    </p:spTree>
+    <p:extLst>
+      <p:ext uri="{BB962C8B-B14F-4D97-AF65-F5344CB8AC3E}">
+        <p14:creationId xmlns:p14="http://schemas.microsoft.com/office/powerpoint/2010/main" val="2030078069"/>
+      </p:ext>
+    </p:extLst>
+  </p:cSld>
+  <p:clrMapOvr>
+    <a:masterClrMapping/>
+  </p:clrMapOvr>
+</p:sld>
+</file>
+
+<file path=ppt/slides/slide8.xml><?xml version="1.0" encoding="utf-8"?>
+<p:sld xmlns:a="http://schemas.openxmlformats.org/drawingml/2006/main" xmlns:r="http://schemas.openxmlformats.org/officeDocument/2006/relationships" xmlns:p="http://schemas.openxmlformats.org/presentationml/2006/main">
+  <p:cSld>
+    <p:spTree>
+      <p:nvGrpSpPr>
+        <p:cNvPr id="1" name=""/>
+        <p:cNvGrpSpPr/>
+        <p:nvPr/>
+      </p:nvGrpSpPr>
+      <p:grpSpPr>
+        <a:xfrm>
+          <a:off x="0" y="0"/>
+          <a:ext cx="0" cy="0"/>
+          <a:chOff x="0" y="0"/>
+          <a:chExt cx="0" cy="0"/>
+        </a:xfrm>
+      </p:grpSpPr>
+      <p:sp>
+        <p:nvSpPr>
+          <p:cNvPr id="2" name="Title 1"/>
+          <p:cNvSpPr>
+            <a:spLocks noGrp="1"/>
+          </p:cNvSpPr>
+          <p:nvPr>
+            <p:ph type="title"/>
+          </p:nvPr>
+        </p:nvSpPr>
+        <p:spPr/>
+        <p:txBody>
+          <a:bodyPr/>
+          <a:lstStyle/>
+          <a:p>
+            <a:r>
+              <a:rPr lang="en-US" dirty="0" smtClean="0"/>
+              <a:t>What Does Map Do</a:t>
+            </a:r>
+            <a:endParaRPr lang="en-US" dirty="0"/>
+          </a:p>
+        </p:txBody>
+      </p:sp>
+      <p:sp>
+        <p:nvSpPr>
+          <p:cNvPr id="3" name="Content Placeholder 2"/>
+          <p:cNvSpPr>
+            <a:spLocks noGrp="1"/>
+          </p:cNvSpPr>
+          <p:nvPr>
+            <p:ph idx="1"/>
+          </p:nvPr>
+        </p:nvSpPr>
+        <p:spPr/>
+        <p:txBody>
+          <a:bodyPr/>
+          <a:lstStyle/>
+          <a:p>
+            <a:r>
+              <a:rPr lang="en-US" dirty="0" smtClean="0"/>
+              <a:t>Map transforms the content of a callback  function, and returns the result as a new array.</a:t>
+            </a:r>
+          </a:p>
+          <a:p>
+            <a:r>
+              <a:rPr lang="en-US" dirty="0" smtClean="0">
+                <a:hlinkClick r:id="rId2"/>
+              </a:rPr>
+              <a:t>https://developer.mozilla.org/en-US/docs/Web/JavaScript/Reference/Global_Objects/Array/map?v=control</a:t>
+            </a:r>
+            <a:r>
+              <a:rPr lang="en-US" dirty="0" smtClean="0"/>
+              <a:t> (MDN Specs)</a:t>
+            </a:r>
+            <a:endParaRPr lang="en-US" dirty="0"/>
+          </a:p>
+        </p:txBody>
+      </p:sp>
+    </p:spTree>
+    <p:extLst>
+      <p:ext uri="{BB962C8B-B14F-4D97-AF65-F5344CB8AC3E}">
+        <p14:creationId xmlns:p14="http://schemas.microsoft.com/office/powerpoint/2010/main" val="1978760518"/>
+      </p:ext>
+    </p:extLst>
+  </p:cSld>
+  <p:clrMapOvr>
+    <a:masterClrMapping/>
+  </p:clrMapOvr>
+</p:sld>
+</file>
+
+<file path=ppt/slides/slide9.xml><?xml version="1.0" encoding="utf-8"?>
+<p:sld xmlns:a="http://schemas.openxmlformats.org/drawingml/2006/main" xmlns:r="http://schemas.openxmlformats.org/officeDocument/2006/relationships" xmlns:p="http://schemas.openxmlformats.org/presentationml/2006/main">
+  <p:cSld>
+    <p:spTree>
+      <p:nvGrpSpPr>
+        <p:cNvPr id="1" name=""/>
+        <p:cNvGrpSpPr/>
+        <p:nvPr/>
+      </p:nvGrpSpPr>
+      <p:grpSpPr>
+        <a:xfrm>
+          <a:off x="0" y="0"/>
+          <a:ext cx="0" cy="0"/>
+          <a:chOff x="0" y="0"/>
+          <a:chExt cx="0" cy="0"/>
+        </a:xfrm>
+      </p:grpSpPr>
+      <p:sp>
+        <p:nvSpPr>
+          <p:cNvPr id="2" name="Title 1"/>
+          <p:cNvSpPr>
+            <a:spLocks noGrp="1"/>
+          </p:cNvSpPr>
+          <p:nvPr>
+            <p:ph type="title"/>
+          </p:nvPr>
+        </p:nvSpPr>
+        <p:spPr/>
+        <p:txBody>
+          <a:bodyPr/>
+          <a:lstStyle/>
+          <a:p>
+            <a:r>
+              <a:rPr lang="en-US" dirty="0" smtClean="0"/>
+              <a:t>What Map Does Not Do</a:t>
+            </a:r>
+            <a:endParaRPr lang="en-US" dirty="0"/>
+          </a:p>
+        </p:txBody>
+      </p:sp>
+      <p:sp>
+        <p:nvSpPr>
+          <p:cNvPr id="3" name="Content Placeholder 2"/>
+          <p:cNvSpPr>
+            <a:spLocks noGrp="1"/>
+          </p:cNvSpPr>
+          <p:nvPr>
+            <p:ph idx="1"/>
+          </p:nvPr>
+        </p:nvSpPr>
+        <p:spPr/>
+        <p:txBody>
+          <a:bodyPr/>
+          <a:lstStyle/>
+          <a:p>
+            <a:r>
+              <a:rPr lang="en-US" dirty="0" smtClean="0"/>
+              <a:t>Modify the original array</a:t>
+            </a:r>
+          </a:p>
+          <a:p>
+            <a:r>
+              <a:rPr lang="en-US" dirty="0" smtClean="0"/>
+              <a:t>Reduce or filter the array</a:t>
+            </a:r>
+            <a:endParaRPr lang="en-US" dirty="0"/>
+          </a:p>
+        </p:txBody>
+      </p:sp>
+    </p:spTree>
+    <p:extLst>
+      <p:ext uri="{BB962C8B-B14F-4D97-AF65-F5344CB8AC3E}">
+        <p14:creationId xmlns:p14="http://schemas.microsoft.com/office/powerpoint/2010/main" val="1767799402"/>
       </p:ext>
     </p:extLst>
   </p:cSld>
@@ -5699,4 +7132,265 @@
     </a:ext>
   </a:extLst>
 </a:theme>
+</file>
+
+<file path=ppt/theme/theme2.xml><?xml version="1.0" encoding="utf-8"?>
+<a:theme xmlns:a="http://schemas.openxmlformats.org/drawingml/2006/main" name="Office Theme">
+  <a:themeElements>
+    <a:clrScheme name="Office">
+      <a:dk1>
+        <a:sysClr val="windowText" lastClr="000000"/>
+      </a:dk1>
+      <a:lt1>
+        <a:sysClr val="window" lastClr="FFFFFF"/>
+      </a:lt1>
+      <a:dk2>
+        <a:srgbClr val="44546A"/>
+      </a:dk2>
+      <a:lt2>
+        <a:srgbClr val="E7E6E6"/>
+      </a:lt2>
+      <a:accent1>
+        <a:srgbClr val="4472C4"/>
+      </a:accent1>
+      <a:accent2>
+        <a:srgbClr val="ED7D31"/>
+      </a:accent2>
+      <a:accent3>
+        <a:srgbClr val="A5A5A5"/>
+      </a:accent3>
+      <a:accent4>
+        <a:srgbClr val="FFC000"/>
+      </a:accent4>
+      <a:accent5>
+        <a:srgbClr val="5B9BD5"/>
+      </a:accent5>
+      <a:accent6>
+        <a:srgbClr val="70AD47"/>
+      </a:accent6>
+      <a:hlink>
+        <a:srgbClr val="0563C1"/>
+      </a:hlink>
+      <a:folHlink>
+        <a:srgbClr val="954F72"/>
+      </a:folHlink>
+    </a:clrScheme>
+    <a:fontScheme name="Office">
+      <a:majorFont>
+        <a:latin typeface="Calibri Light" panose="020F0302020204030204"/>
+        <a:ea typeface=""/>
+        <a:cs typeface=""/>
+        <a:font script="Jpan" typeface="Yu Gothic Light"/>
+        <a:font script="Hang" typeface="맑은 고딕"/>
+        <a:font script="Hans" typeface="DengXian Light"/>
+        <a:font script="Hant" typeface="新細明體"/>
+        <a:font script="Arab" typeface="Times New Roman"/>
+        <a:font script="Hebr" typeface="Times New Roman"/>
+        <a:font script="Thai" typeface="Angsana New"/>
+        <a:font script="Ethi" typeface="Nyala"/>
+        <a:font script="Beng" typeface="Vrinda"/>
+        <a:font script="Gujr" typeface="Shruti"/>
+        <a:font script="Khmr" typeface="MoolBoran"/>
+        <a:font script="Knda" typeface="Tunga"/>
+        <a:font script="Guru" typeface="Raavi"/>
+        <a:font script="Cans" typeface="Euphemia"/>
+        <a:font script="Cher" typeface="Plantagenet Cherokee"/>
+        <a:font script="Yiii" typeface="Microsoft Yi Baiti"/>
+        <a:font script="Tibt" typeface="Microsoft Himalaya"/>
+        <a:font script="Thaa" typeface="MV Boli"/>
+        <a:font script="Deva" typeface="Mangal"/>
+        <a:font script="Telu" typeface="Gautami"/>
+        <a:font script="Taml" typeface="Latha"/>
+        <a:font script="Syrc" typeface="Estrangelo Edessa"/>
+        <a:font script="Orya" typeface="Kalinga"/>
+        <a:font script="Mlym" typeface="Kartika"/>
+        <a:font script="Laoo" typeface="DokChampa"/>
+        <a:font script="Sinh" typeface="Iskoola Pota"/>
+        <a:font script="Mong" typeface="Mongolian Baiti"/>
+        <a:font script="Viet" typeface="Times New Roman"/>
+        <a:font script="Uigh" typeface="Microsoft Uighur"/>
+        <a:font script="Geor" typeface="Sylfaen"/>
+      </a:majorFont>
+      <a:minorFont>
+        <a:latin typeface="Calibri" panose="020F0502020204030204"/>
+        <a:ea typeface=""/>
+        <a:cs typeface=""/>
+        <a:font script="Jpan" typeface="Yu Gothic"/>
+        <a:font script="Hang" typeface="맑은 고딕"/>
+        <a:font script="Hans" typeface="DengXian"/>
+        <a:font script="Hant" typeface="新細明體"/>
+        <a:font script="Arab" typeface="Arial"/>
+        <a:font script="Hebr" typeface="Arial"/>
+        <a:font script="Thai" typeface="Cordia New"/>
+        <a:font script="Ethi" typeface="Nyala"/>
+        <a:font script="Beng" typeface="Vrinda"/>
+        <a:font script="Gujr" typeface="Shruti"/>
+        <a:font script="Khmr" typeface="DaunPenh"/>
+        <a:font script="Knda" typeface="Tunga"/>
+        <a:font script="Guru" typeface="Raavi"/>
+        <a:font script="Cans" typeface="Euphemia"/>
+        <a:font script="Cher" typeface="Plantagenet Cherokee"/>
+        <a:font script="Yiii" typeface="Microsoft Yi Baiti"/>
+        <a:font script="Tibt" typeface="Microsoft Himalaya"/>
+        <a:font script="Thaa" typeface="MV Boli"/>
+        <a:font script="Deva" typeface="Mangal"/>
+        <a:font script="Telu" typeface="Gautami"/>
+        <a:font script="Taml" typeface="Latha"/>
+        <a:font script="Syrc" typeface="Estrangelo Edessa"/>
+        <a:font script="Orya" typeface="Kalinga"/>
+        <a:font script="Mlym" typeface="Kartika"/>
+        <a:font script="Laoo" typeface="DokChampa"/>
+        <a:font script="Sinh" typeface="Iskoola Pota"/>
+        <a:font script="Mong" typeface="Mongolian Baiti"/>
+        <a:font script="Viet" typeface="Arial"/>
+        <a:font script="Uigh" typeface="Microsoft Uighur"/>
+        <a:font script="Geor" typeface="Sylfaen"/>
+      </a:minorFont>
+    </a:fontScheme>
+    <a:fmtScheme name="Office">
+      <a:fillStyleLst>
+        <a:solidFill>
+          <a:schemeClr val="phClr"/>
+        </a:solidFill>
+        <a:gradFill rotWithShape="1">
+          <a:gsLst>
+            <a:gs pos="0">
+              <a:schemeClr val="phClr">
+                <a:lumMod val="110000"/>
+                <a:satMod val="105000"/>
+                <a:tint val="67000"/>
+              </a:schemeClr>
+            </a:gs>
+            <a:gs pos="50000">
+              <a:schemeClr val="phClr">
+                <a:lumMod val="105000"/>
+                <a:satMod val="103000"/>
+                <a:tint val="73000"/>
+              </a:schemeClr>
+            </a:gs>
+            <a:gs pos="100000">
+              <a:schemeClr val="phClr">
+                <a:lumMod val="105000"/>
+                <a:satMod val="109000"/>
+                <a:tint val="81000"/>
+              </a:schemeClr>
+            </a:gs>
+          </a:gsLst>
+          <a:lin ang="5400000" scaled="0"/>
+        </a:gradFill>
+        <a:gradFill rotWithShape="1">
+          <a:gsLst>
+            <a:gs pos="0">
+              <a:schemeClr val="phClr">
+                <a:satMod val="103000"/>
+                <a:lumMod val="102000"/>
+                <a:tint val="94000"/>
+              </a:schemeClr>
+            </a:gs>
+            <a:gs pos="50000">
+              <a:schemeClr val="phClr">
+                <a:satMod val="110000"/>
+                <a:lumMod val="100000"/>
+                <a:shade val="100000"/>
+              </a:schemeClr>
+            </a:gs>
+            <a:gs pos="100000">
+              <a:schemeClr val="phClr">
+                <a:lumMod val="99000"/>
+                <a:satMod val="120000"/>
+                <a:shade val="78000"/>
+              </a:schemeClr>
+            </a:gs>
+          </a:gsLst>
+          <a:lin ang="5400000" scaled="0"/>
+        </a:gradFill>
+      </a:fillStyleLst>
+      <a:lnStyleLst>
+        <a:ln w="6350" cap="flat" cmpd="sng" algn="ctr">
+          <a:solidFill>
+            <a:schemeClr val="phClr"/>
+          </a:solidFill>
+          <a:prstDash val="solid"/>
+          <a:miter lim="800000"/>
+        </a:ln>
+        <a:ln w="12700" cap="flat" cmpd="sng" algn="ctr">
+          <a:solidFill>
+            <a:schemeClr val="phClr"/>
+          </a:solidFill>
+          <a:prstDash val="solid"/>
+          <a:miter lim="800000"/>
+        </a:ln>
+        <a:ln w="19050" cap="flat" cmpd="sng" algn="ctr">
+          <a:solidFill>
+            <a:schemeClr val="phClr"/>
+          </a:solidFill>
+          <a:prstDash val="solid"/>
+          <a:miter lim="800000"/>
+        </a:ln>
+      </a:lnStyleLst>
+      <a:effectStyleLst>
+        <a:effectStyle>
+          <a:effectLst/>
+        </a:effectStyle>
+        <a:effectStyle>
+          <a:effectLst/>
+        </a:effectStyle>
+        <a:effectStyle>
+          <a:effectLst>
+            <a:outerShdw blurRad="57150" dist="19050" dir="5400000" algn="ctr" rotWithShape="0">
+              <a:srgbClr val="000000">
+                <a:alpha val="63000"/>
+              </a:srgbClr>
+            </a:outerShdw>
+          </a:effectLst>
+        </a:effectStyle>
+      </a:effectStyleLst>
+      <a:bgFillStyleLst>
+        <a:solidFill>
+          <a:schemeClr val="phClr"/>
+        </a:solidFill>
+        <a:solidFill>
+          <a:schemeClr val="phClr">
+            <a:tint val="95000"/>
+            <a:satMod val="170000"/>
+          </a:schemeClr>
+        </a:solidFill>
+        <a:gradFill rotWithShape="1">
+          <a:gsLst>
+            <a:gs pos="0">
+              <a:schemeClr val="phClr">
+                <a:tint val="93000"/>
+                <a:satMod val="150000"/>
+                <a:shade val="98000"/>
+                <a:lumMod val="102000"/>
+              </a:schemeClr>
+            </a:gs>
+            <a:gs pos="50000">
+              <a:schemeClr val="phClr">
+                <a:tint val="98000"/>
+                <a:satMod val="130000"/>
+                <a:shade val="90000"/>
+                <a:lumMod val="103000"/>
+              </a:schemeClr>
+            </a:gs>
+            <a:gs pos="100000">
+              <a:schemeClr val="phClr">
+                <a:shade val="63000"/>
+                <a:satMod val="120000"/>
+              </a:schemeClr>
+            </a:gs>
+          </a:gsLst>
+          <a:lin ang="5400000" scaled="0"/>
+        </a:gradFill>
+      </a:bgFillStyleLst>
+    </a:fmtScheme>
+  </a:themeElements>
+  <a:objectDefaults/>
+  <a:extraClrSchemeLst/>
+  <a:extLst>
+    <a:ext uri="{05A4C25C-085E-4340-85A3-A5531E510DB2}">
+      <thm15:themeFamily xmlns:thm15="http://schemas.microsoft.com/office/thememl/2012/main" name="Office Theme" id="{62F939B6-93AF-4DB8-9C6B-D6C7DFDC589F}" vid="{4A3C46E8-61CC-4603-A589-7422A47A8E4A}"/>
+    </a:ext>
+  </a:extLst>
+</a:theme>
 </file>
</xml_diff>